<commit_message>
changed navbar burger menu
</commit_message>
<xml_diff>
--- a/Leave Management System.pptx
+++ b/Leave Management System.pptx
@@ -17,6 +17,7 @@
     <p:sldId id="272" r:id="rId11"/>
     <p:sldId id="261" r:id="rId12"/>
     <p:sldId id="262" r:id="rId13"/>
+    <p:sldId id="275" r:id="rId14"/>
   </p:sldIdLst>
   <p:sldSz cx="12192000" cy="6858000"/>
   <p:notesSz cx="6858000" cy="9144000"/>
@@ -845,7 +846,7 @@
           <a:p>
             <a:fld id="{4C4F69B4-95D8-43D0-B5C2-24E215F5D8AD}" type="datetimeFigureOut">
               <a:rPr lang="en-IN" smtClean="0"/>
-              <a:t>28-11-2022</a:t>
+              <a:t>30-11-2022</a:t>
             </a:fld>
             <a:endParaRPr lang="en-IN"/>
           </a:p>
@@ -1096,7 +1097,7 @@
           <a:p>
             <a:fld id="{4C4F69B4-95D8-43D0-B5C2-24E215F5D8AD}" type="datetimeFigureOut">
               <a:rPr lang="en-IN" smtClean="0"/>
-              <a:t>28-11-2022</a:t>
+              <a:t>30-11-2022</a:t>
             </a:fld>
             <a:endParaRPr lang="en-IN"/>
           </a:p>
@@ -1410,7 +1411,7 @@
           <a:p>
             <a:fld id="{4C4F69B4-95D8-43D0-B5C2-24E215F5D8AD}" type="datetimeFigureOut">
               <a:rPr lang="en-IN" smtClean="0"/>
-              <a:t>28-11-2022</a:t>
+              <a:t>30-11-2022</a:t>
             </a:fld>
             <a:endParaRPr lang="en-IN"/>
           </a:p>
@@ -1751,7 +1752,7 @@
           <a:p>
             <a:fld id="{4C4F69B4-95D8-43D0-B5C2-24E215F5D8AD}" type="datetimeFigureOut">
               <a:rPr lang="en-IN" smtClean="0"/>
-              <a:t>28-11-2022</a:t>
+              <a:t>30-11-2022</a:t>
             </a:fld>
             <a:endParaRPr lang="en-IN"/>
           </a:p>
@@ -2065,7 +2066,7 @@
           <a:p>
             <a:fld id="{4C4F69B4-95D8-43D0-B5C2-24E215F5D8AD}" type="datetimeFigureOut">
               <a:rPr lang="en-IN" smtClean="0"/>
-              <a:t>28-11-2022</a:t>
+              <a:t>30-11-2022</a:t>
             </a:fld>
             <a:endParaRPr lang="en-IN"/>
           </a:p>
@@ -2458,7 +2459,7 @@
           <a:p>
             <a:fld id="{4C4F69B4-95D8-43D0-B5C2-24E215F5D8AD}" type="datetimeFigureOut">
               <a:rPr lang="en-IN" smtClean="0"/>
-              <a:t>28-11-2022</a:t>
+              <a:t>30-11-2022</a:t>
             </a:fld>
             <a:endParaRPr lang="en-IN"/>
           </a:p>
@@ -2628,7 +2629,7 @@
           <a:p>
             <a:fld id="{4C4F69B4-95D8-43D0-B5C2-24E215F5D8AD}" type="datetimeFigureOut">
               <a:rPr lang="en-IN" smtClean="0"/>
-              <a:t>28-11-2022</a:t>
+              <a:t>30-11-2022</a:t>
             </a:fld>
             <a:endParaRPr lang="en-IN"/>
           </a:p>
@@ -2808,7 +2809,7 @@
           <a:p>
             <a:fld id="{4C4F69B4-95D8-43D0-B5C2-24E215F5D8AD}" type="datetimeFigureOut">
               <a:rPr lang="en-IN" smtClean="0"/>
-              <a:t>28-11-2022</a:t>
+              <a:t>30-11-2022</a:t>
             </a:fld>
             <a:endParaRPr lang="en-IN"/>
           </a:p>
@@ -2984,7 +2985,7 @@
           <a:p>
             <a:fld id="{4C4F69B4-95D8-43D0-B5C2-24E215F5D8AD}" type="datetimeFigureOut">
               <a:rPr lang="en-IN" smtClean="0"/>
-              <a:t>28-11-2022</a:t>
+              <a:t>30-11-2022</a:t>
             </a:fld>
             <a:endParaRPr lang="en-IN"/>
           </a:p>
@@ -3231,7 +3232,7 @@
           <a:p>
             <a:fld id="{4C4F69B4-95D8-43D0-B5C2-24E215F5D8AD}" type="datetimeFigureOut">
               <a:rPr lang="en-IN" smtClean="0"/>
-              <a:t>28-11-2022</a:t>
+              <a:t>30-11-2022</a:t>
             </a:fld>
             <a:endParaRPr lang="en-IN"/>
           </a:p>
@@ -3463,7 +3464,7 @@
           <a:p>
             <a:fld id="{4C4F69B4-95D8-43D0-B5C2-24E215F5D8AD}" type="datetimeFigureOut">
               <a:rPr lang="en-IN" smtClean="0"/>
-              <a:t>28-11-2022</a:t>
+              <a:t>30-11-2022</a:t>
             </a:fld>
             <a:endParaRPr lang="en-IN"/>
           </a:p>
@@ -3837,7 +3838,7 @@
           <a:p>
             <a:fld id="{4C4F69B4-95D8-43D0-B5C2-24E215F5D8AD}" type="datetimeFigureOut">
               <a:rPr lang="en-IN" smtClean="0"/>
-              <a:t>28-11-2022</a:t>
+              <a:t>30-11-2022</a:t>
             </a:fld>
             <a:endParaRPr lang="en-IN"/>
           </a:p>
@@ -3960,7 +3961,7 @@
           <a:p>
             <a:fld id="{4C4F69B4-95D8-43D0-B5C2-24E215F5D8AD}" type="datetimeFigureOut">
               <a:rPr lang="en-IN" smtClean="0"/>
-              <a:t>28-11-2022</a:t>
+              <a:t>30-11-2022</a:t>
             </a:fld>
             <a:endParaRPr lang="en-IN"/>
           </a:p>
@@ -4055,7 +4056,7 @@
           <a:p>
             <a:fld id="{4C4F69B4-95D8-43D0-B5C2-24E215F5D8AD}" type="datetimeFigureOut">
               <a:rPr lang="en-IN" smtClean="0"/>
-              <a:t>28-11-2022</a:t>
+              <a:t>30-11-2022</a:t>
             </a:fld>
             <a:endParaRPr lang="en-IN"/>
           </a:p>
@@ -4310,7 +4311,7 @@
           <a:p>
             <a:fld id="{4C4F69B4-95D8-43D0-B5C2-24E215F5D8AD}" type="datetimeFigureOut">
               <a:rPr lang="en-IN" smtClean="0"/>
-              <a:t>28-11-2022</a:t>
+              <a:t>30-11-2022</a:t>
             </a:fld>
             <a:endParaRPr lang="en-IN"/>
           </a:p>
@@ -4573,7 +4574,7 @@
           <a:p>
             <a:fld id="{4C4F69B4-95D8-43D0-B5C2-24E215F5D8AD}" type="datetimeFigureOut">
               <a:rPr lang="en-IN" smtClean="0"/>
-              <a:t>28-11-2022</a:t>
+              <a:t>30-11-2022</a:t>
             </a:fld>
             <a:endParaRPr lang="en-IN"/>
           </a:p>
@@ -5316,7 +5317,7 @@
           <a:p>
             <a:fld id="{4C4F69B4-95D8-43D0-B5C2-24E215F5D8AD}" type="datetimeFigureOut">
               <a:rPr lang="en-IN" smtClean="0"/>
-              <a:t>28-11-2022</a:t>
+              <a:t>30-11-2022</a:t>
             </a:fld>
             <a:endParaRPr lang="en-IN"/>
           </a:p>
@@ -5870,7 +5871,7 @@
         </p:blipFill>
         <p:spPr>
           <a:xfrm>
-            <a:off x="5186362" y="170354"/>
+            <a:off x="4696168" y="170354"/>
             <a:ext cx="1819275" cy="2145572"/>
           </a:xfrm>
           <a:prstGeom prst="rect">
@@ -6822,6 +6823,229 @@
 </p:sld>
 </file>
 
+<file path=ppt/slides/slide13.xml><?xml version="1.0" encoding="utf-8"?>
+<p:sld xmlns:a="http://schemas.openxmlformats.org/drawingml/2006/main" xmlns:r="http://schemas.openxmlformats.org/officeDocument/2006/relationships" xmlns:p="http://schemas.openxmlformats.org/presentationml/2006/main">
+  <p:cSld>
+    <p:spTree>
+      <p:nvGrpSpPr>
+        <p:cNvPr id="1" name=""/>
+        <p:cNvGrpSpPr/>
+        <p:nvPr/>
+      </p:nvGrpSpPr>
+      <p:grpSpPr>
+        <a:xfrm>
+          <a:off x="0" y="0"/>
+          <a:ext cx="0" cy="0"/>
+          <a:chOff x="0" y="0"/>
+          <a:chExt cx="0" cy="0"/>
+        </a:xfrm>
+      </p:grpSpPr>
+      <p:sp>
+        <p:nvSpPr>
+          <p:cNvPr id="2" name="Title 1">
+            <a:extLst>
+              <a:ext uri="{FF2B5EF4-FFF2-40B4-BE49-F238E27FC236}">
+                <a16:creationId xmlns:a16="http://schemas.microsoft.com/office/drawing/2014/main" id="{D7BA8790-A9AE-72E4-4AAC-5E7411EE0D98}"/>
+              </a:ext>
+            </a:extLst>
+          </p:cNvPr>
+          <p:cNvSpPr>
+            <a:spLocks noGrp="1"/>
+          </p:cNvSpPr>
+          <p:nvPr>
+            <p:ph type="title"/>
+          </p:nvPr>
+        </p:nvSpPr>
+        <p:spPr/>
+        <p:txBody>
+          <a:bodyPr>
+            <a:normAutofit/>
+          </a:bodyPr>
+          <a:lstStyle/>
+          <a:p>
+            <a:pPr algn="ctr"/>
+            <a:r>
+              <a:rPr lang="en-IN" sz="8000" b="1" i="1" u="sng" dirty="0">
+                <a:latin typeface="Lucida Calligraphy" panose="03010101010101010101" pitchFamily="66" charset="0"/>
+              </a:rPr>
+              <a:t>THANK YOU</a:t>
+            </a:r>
+          </a:p>
+        </p:txBody>
+      </p:sp>
+      <p:sp>
+        <p:nvSpPr>
+          <p:cNvPr id="3" name="Content Placeholder 2">
+            <a:extLst>
+              <a:ext uri="{FF2B5EF4-FFF2-40B4-BE49-F238E27FC236}">
+                <a16:creationId xmlns:a16="http://schemas.microsoft.com/office/drawing/2014/main" id="{02C74554-7E90-23ED-C4F2-4B5E20CAAAA5}"/>
+              </a:ext>
+            </a:extLst>
+          </p:cNvPr>
+          <p:cNvSpPr>
+            <a:spLocks noGrp="1"/>
+          </p:cNvSpPr>
+          <p:nvPr>
+            <p:ph idx="1"/>
+          </p:nvPr>
+        </p:nvSpPr>
+        <p:spPr>
+          <a:xfrm>
+            <a:off x="677334" y="2160589"/>
+            <a:ext cx="9126542" cy="4202504"/>
+          </a:xfrm>
+        </p:spPr>
+        <p:txBody>
+          <a:bodyPr>
+            <a:normAutofit/>
+          </a:bodyPr>
+          <a:lstStyle/>
+          <a:p>
+            <a:r>
+              <a:rPr lang="en-IN" dirty="0"/>
+              <a:t>Website link:-</a:t>
+            </a:r>
+          </a:p>
+          <a:p>
+            <a:pPr marL="457200" lvl="1" indent="0">
+              <a:buNone/>
+            </a:pPr>
+            <a:r>
+              <a:rPr lang="en-IN" dirty="0"/>
+              <a:t>                           </a:t>
+            </a:r>
+          </a:p>
+          <a:p>
+            <a:pPr lvl="1"/>
+            <a:endParaRPr lang="en-IN" dirty="0"/>
+          </a:p>
+          <a:p>
+            <a:pPr lvl="1"/>
+            <a:endParaRPr lang="en-IN" dirty="0"/>
+          </a:p>
+          <a:p>
+            <a:pPr lvl="1"/>
+            <a:endParaRPr lang="en-IN" dirty="0"/>
+          </a:p>
+          <a:p>
+            <a:pPr lvl="1"/>
+            <a:endParaRPr lang="en-IN" dirty="0"/>
+          </a:p>
+          <a:p>
+            <a:pPr lvl="1"/>
+            <a:endParaRPr lang="en-IN" dirty="0"/>
+          </a:p>
+          <a:p>
+            <a:pPr lvl="1"/>
+            <a:endParaRPr lang="en-IN" dirty="0"/>
+          </a:p>
+          <a:p>
+            <a:pPr marL="2743200" lvl="6" indent="0">
+              <a:buNone/>
+            </a:pPr>
+            <a:endParaRPr lang="en-IN" dirty="0">
+              <a:hlinkClick r:id="rId2">
+                <a:extLst>
+                  <a:ext uri="{A12FA001-AC4F-418D-AE19-62706E023703}">
+                    <ahyp:hlinkClr xmlns:ahyp="http://schemas.microsoft.com/office/drawing/2018/hyperlinkcolor" val="tx"/>
+                  </a:ext>
+                </a:extLst>
+              </a:hlinkClick>
+            </a:endParaRPr>
+          </a:p>
+          <a:p>
+            <a:pPr marL="2286000" lvl="5" indent="0">
+              <a:buNone/>
+            </a:pPr>
+            <a:r>
+              <a:rPr lang="en-US" sz="2200" u="sng" dirty="0">
+                <a:solidFill>
+                  <a:srgbClr val="002060"/>
+                </a:solidFill>
+                <a:effectLst/>
+                <a:latin typeface="Times New Roman" panose="02020603050405020304" pitchFamily="18" charset="0"/>
+                <a:ea typeface="Calibri" panose="020F0502020204030204" pitchFamily="34" charset="0"/>
+                <a:cs typeface="Times New Roman" panose="02020603050405020304" pitchFamily="18" charset="0"/>
+                <a:hlinkClick r:id="rId2">
+                  <a:extLst>
+                    <a:ext uri="{A12FA001-AC4F-418D-AE19-62706E023703}">
+                      <ahyp:hlinkClr xmlns:ahyp="http://schemas.microsoft.com/office/drawing/2018/hyperlinkcolor" val="tx"/>
+                    </a:ext>
+                  </a:extLst>
+                </a:hlinkClick>
+              </a:rPr>
+              <a:t>https://web-production-1e3a.up.railway.app/</a:t>
+            </a:r>
+            <a:endParaRPr lang="en-IN" sz="2200" dirty="0">
+              <a:solidFill>
+                <a:srgbClr val="002060"/>
+              </a:solidFill>
+              <a:effectLst/>
+              <a:latin typeface="Calibri" panose="020F0502020204030204" pitchFamily="34" charset="0"/>
+              <a:ea typeface="Calibri" panose="020F0502020204030204" pitchFamily="34" charset="0"/>
+              <a:cs typeface="Times New Roman" panose="02020603050405020304" pitchFamily="18" charset="0"/>
+            </a:endParaRPr>
+          </a:p>
+          <a:p>
+            <a:pPr lvl="6"/>
+            <a:endParaRPr lang="en-IN" dirty="0"/>
+          </a:p>
+          <a:p>
+            <a:pPr lvl="6"/>
+            <a:endParaRPr lang="en-IN" dirty="0"/>
+          </a:p>
+        </p:txBody>
+      </p:sp>
+      <p:pic>
+        <p:nvPicPr>
+          <p:cNvPr id="4" name="Picture 3">
+            <a:extLst>
+              <a:ext uri="{FF2B5EF4-FFF2-40B4-BE49-F238E27FC236}">
+                <a16:creationId xmlns:a16="http://schemas.microsoft.com/office/drawing/2014/main" id="{0966F5FB-5F01-733E-B8E7-D16FBAA1C04B}"/>
+              </a:ext>
+            </a:extLst>
+          </p:cNvPr>
+          <p:cNvPicPr>
+            <a:picLocks noChangeAspect="1"/>
+          </p:cNvPicPr>
+          <p:nvPr/>
+        </p:nvPicPr>
+        <p:blipFill rotWithShape="1">
+          <a:blip r:embed="rId3"/>
+          <a:srcRect l="23802" t="17969" r="23524" b="37947"/>
+          <a:stretch/>
+        </p:blipFill>
+        <p:spPr bwMode="auto">
+          <a:xfrm>
+            <a:off x="3823198" y="2034696"/>
+            <a:ext cx="3448451" cy="3470557"/>
+          </a:xfrm>
+          <a:prstGeom prst="rect">
+            <a:avLst/>
+          </a:prstGeom>
+          <a:ln>
+            <a:noFill/>
+          </a:ln>
+          <a:extLst>
+            <a:ext uri="{53640926-AAD7-44D8-BBD7-CCE9431645EC}">
+              <a14:shadowObscured xmlns:a14="http://schemas.microsoft.com/office/drawing/2010/main"/>
+            </a:ext>
+          </a:extLst>
+        </p:spPr>
+      </p:pic>
+    </p:spTree>
+    <p:extLst>
+      <p:ext uri="{BB962C8B-B14F-4D97-AF65-F5344CB8AC3E}">
+        <p14:creationId xmlns:p14="http://schemas.microsoft.com/office/powerpoint/2010/main" val="1256384751"/>
+      </p:ext>
+    </p:extLst>
+  </p:cSld>
+  <p:clrMapOvr>
+    <a:masterClrMapping/>
+  </p:clrMapOvr>
+</p:sld>
+</file>
+
 <file path=ppt/slides/slide2.xml><?xml version="1.0" encoding="utf-8"?>
 <p:sld xmlns:a="http://schemas.openxmlformats.org/drawingml/2006/main" xmlns:r="http://schemas.openxmlformats.org/officeDocument/2006/relationships" xmlns:p="http://schemas.openxmlformats.org/presentationml/2006/main">
   <p:cSld>
@@ -6944,7 +7168,27 @@
                 <a:ea typeface="+mn-ea"/>
                 <a:cs typeface="Arial" panose="020B0604020202020204" pitchFamily="34" charset="0"/>
               </a:rPr>
-              <a:t>This approach basically deals with the record of leaves taken by faculty members and students in the organisation</a:t>
+              <a:t>This approach basically deals with the record of leaves taken by </a:t>
+            </a:r>
+            <a:r>
+              <a:rPr lang="en-IN" sz="2400" dirty="0">
+                <a:solidFill>
+                  <a:srgbClr val="000000"/>
+                </a:solidFill>
+                <a:cs typeface="Arial" panose="020B0604020202020204" pitchFamily="34" charset="0"/>
+              </a:rPr>
+              <a:t>the employees</a:t>
+            </a:r>
+            <a:r>
+              <a:rPr lang="en-IN" sz="2400" kern="1200" dirty="0">
+                <a:solidFill>
+                  <a:srgbClr val="000000"/>
+                </a:solidFill>
+                <a:effectLst/>
+                <a:ea typeface="+mn-ea"/>
+                <a:cs typeface="Arial" panose="020B0604020202020204" pitchFamily="34" charset="0"/>
+              </a:rPr>
+              <a:t> in the organisation</a:t>
             </a:r>
             <a:endParaRPr lang="en-IN" sz="2400" dirty="0">
               <a:effectLst/>

</xml_diff>